<commit_message>
add multiple files practice
</commit_message>
<xml_diff>
--- a/lessons/B_DataTypes_Strings/Class2A_strings.pptx
+++ b/lessons/B_DataTypes_Strings/Class2A_strings.pptx
@@ -5,20 +5,19 @@
     <p:sldMasterId id="2147483660" r:id="rId1"/>
   </p:sldMasterIdLst>
   <p:notesMasterIdLst>
-    <p:notesMasterId r:id="rId13"/>
+    <p:notesMasterId r:id="rId12"/>
   </p:notesMasterIdLst>
   <p:sldIdLst>
     <p:sldId id="593" r:id="rId2"/>
-    <p:sldId id="719" r:id="rId3"/>
-    <p:sldId id="662" r:id="rId4"/>
-    <p:sldId id="663" r:id="rId5"/>
-    <p:sldId id="712" r:id="rId6"/>
-    <p:sldId id="718" r:id="rId7"/>
-    <p:sldId id="713" r:id="rId8"/>
-    <p:sldId id="714" r:id="rId9"/>
-    <p:sldId id="715" r:id="rId10"/>
-    <p:sldId id="716" r:id="rId11"/>
-    <p:sldId id="717" r:id="rId12"/>
+    <p:sldId id="662" r:id="rId3"/>
+    <p:sldId id="663" r:id="rId4"/>
+    <p:sldId id="712" r:id="rId5"/>
+    <p:sldId id="718" r:id="rId6"/>
+    <p:sldId id="713" r:id="rId7"/>
+    <p:sldId id="714" r:id="rId8"/>
+    <p:sldId id="715" r:id="rId9"/>
+    <p:sldId id="716" r:id="rId10"/>
+    <p:sldId id="717" r:id="rId11"/>
   </p:sldIdLst>
   <p:sldSz cx="9144000" cy="6858000" type="screen4x3"/>
   <p:notesSz cx="6858000" cy="9144000"/>
@@ -224,7 +223,7 @@
           <a:p>
             <a:fld id="{B0C0A60C-850A-4EA4-9C14-A8FE98B94505}" type="datetimeFigureOut">
               <a:rPr lang="en-US" smtClean="0"/>
-              <a:t>1/10/21</a:t>
+              <a:t>1/23/21</a:t>
             </a:fld>
             <a:endParaRPr lang="en-US"/>
           </a:p>
@@ -623,7 +622,7 @@
           <a:p>
             <a:fld id="{5738B90E-0779-4C36-915C-6F05FCD89456}" type="datetime1">
               <a:rPr lang="en-US" smtClean="0"/>
-              <a:t>1/10/21</a:t>
+              <a:t>1/23/21</a:t>
             </a:fld>
             <a:endParaRPr lang="en-US"/>
           </a:p>
@@ -803,7 +802,7 @@
           <a:p>
             <a:fld id="{7B9EA29D-D431-42FE-B7B6-AAE4454C77D3}" type="datetime1">
               <a:rPr lang="en-US" smtClean="0"/>
-              <a:t>1/10/21</a:t>
+              <a:t>1/23/21</a:t>
             </a:fld>
             <a:endParaRPr lang="en-US"/>
           </a:p>
@@ -1060,7 +1059,7 @@
           <a:p>
             <a:fld id="{690D8A1E-EA8F-46C1-B891-AE0C00D9C314}" type="datetime1">
               <a:rPr lang="en-US" smtClean="0"/>
-              <a:t>1/10/21</a:t>
+              <a:t>1/23/21</a:t>
             </a:fld>
             <a:endParaRPr lang="en-US"/>
           </a:p>
@@ -1351,7 +1350,7 @@
           <a:p>
             <a:fld id="{D753EFC8-4232-4598-94F6-94C0EBAFC469}" type="datetime1">
               <a:rPr lang="en-US" smtClean="0"/>
-              <a:t>1/10/21</a:t>
+              <a:t>1/23/21</a:t>
             </a:fld>
             <a:endParaRPr lang="en-US"/>
           </a:p>
@@ -1663,7 +1662,7 @@
           <a:p>
             <a:fld id="{F3161074-1C18-4AE7-957D-F18524378C85}" type="datetime1">
               <a:rPr lang="en-US" smtClean="0"/>
-              <a:t>1/10/21</a:t>
+              <a:t>1/23/21</a:t>
             </a:fld>
             <a:endParaRPr lang="en-US"/>
           </a:p>
@@ -1899,7 +1898,7 @@
           <a:p>
             <a:fld id="{69BE256C-8D9A-4404-B47D-41A1AE514425}" type="datetime1">
               <a:rPr lang="en-US" smtClean="0"/>
-              <a:t>1/10/21</a:t>
+              <a:t>1/23/21</a:t>
             </a:fld>
             <a:endParaRPr lang="en-US"/>
           </a:p>
@@ -2330,7 +2329,7 @@
           <a:p>
             <a:fld id="{66CB2154-9035-4012-8189-BAAB61C5A5EE}" type="datetime1">
               <a:rPr lang="en-US" smtClean="0"/>
-              <a:t>1/10/21</a:t>
+              <a:t>1/23/21</a:t>
             </a:fld>
             <a:endParaRPr lang="en-US"/>
           </a:p>
@@ -2501,7 +2500,7 @@
           <a:p>
             <a:fld id="{6700A58B-DD98-43D0-B791-721480A02982}" type="datetime1">
               <a:rPr lang="en-US" smtClean="0"/>
-              <a:t>1/10/21</a:t>
+              <a:t>1/23/21</a:t>
             </a:fld>
             <a:endParaRPr lang="en-US"/>
           </a:p>
@@ -2690,7 +2689,7 @@
           <a:p>
             <a:fld id="{7DB6E382-4F61-4E24-BE1A-377EC83D0E3A}" type="datetime1">
               <a:rPr lang="en-US" smtClean="0"/>
-              <a:t>1/10/21</a:t>
+              <a:t>1/23/21</a:t>
             </a:fld>
             <a:endParaRPr lang="en-US"/>
           </a:p>
@@ -2998,7 +2997,7 @@
           <a:p>
             <a:fld id="{4142EED6-FC16-45B9-B8C4-2BC5DBA88325}" type="datetime1">
               <a:rPr lang="en-US" smtClean="0"/>
-              <a:t>1/10/21</a:t>
+              <a:t>1/23/21</a:t>
             </a:fld>
             <a:endParaRPr lang="en-US"/>
           </a:p>
@@ -3313,7 +3312,7 @@
           <a:p>
             <a:fld id="{DF59512B-4F1D-43D7-8819-2F53FEF69650}" type="datetime1">
               <a:rPr lang="en-US" smtClean="0"/>
-              <a:t>1/10/21</a:t>
+              <a:t>1/23/21</a:t>
             </a:fld>
             <a:endParaRPr lang="en-US"/>
           </a:p>
@@ -3586,7 +3585,7 @@
           <a:p>
             <a:fld id="{08437B94-E2BF-44DC-ADC5-B05FC9934E9D}" type="datetime1">
               <a:rPr lang="en-US" smtClean="0"/>
-              <a:t>1/10/21</a:t>
+              <a:t>1/23/21</a:t>
             </a:fld>
             <a:endParaRPr lang="en-US"/>
           </a:p>
@@ -4070,7 +4069,7 @@
           <a:p>
             <a:fld id="{5738B90E-0779-4C36-915C-6F05FCD89456}" type="datetime1">
               <a:rPr lang="en-US" smtClean="0"/>
-              <a:t>1/10/21</a:t>
+              <a:t>1/23/21</a:t>
             </a:fld>
             <a:endParaRPr lang="en-US"/>
           </a:p>
@@ -4254,524 +4253,7 @@
           <a:p>
             <a:fld id="{6700A58B-DD98-43D0-B791-721480A02982}" type="datetime1">
               <a:rPr lang="en-US" smtClean="0"/>
-              <a:t>1/10/21</a:t>
-            </a:fld>
-            <a:endParaRPr lang="en-US"/>
-          </a:p>
-        </p:txBody>
-      </p:sp>
-      <p:sp>
-        <p:nvSpPr>
-          <p:cNvPr id="3" name="Title 2"/>
-          <p:cNvSpPr>
-            <a:spLocks noGrp="1"/>
-          </p:cNvSpPr>
-          <p:nvPr>
-            <p:ph type="title"/>
-          </p:nvPr>
-        </p:nvSpPr>
-        <p:spPr/>
-        <p:txBody>
-          <a:bodyPr/>
-          <a:lstStyle/>
-          <a:p>
-            <a:r>
-              <a:rPr lang="en-US" dirty="0"/>
-              <a:t>R packages to deal with misspelling</a:t>
-            </a:r>
-          </a:p>
-        </p:txBody>
-      </p:sp>
-      <p:sp>
-        <p:nvSpPr>
-          <p:cNvPr id="4" name="Slide Number Placeholder 3"/>
-          <p:cNvSpPr>
-            <a:spLocks noGrp="1"/>
-          </p:cNvSpPr>
-          <p:nvPr>
-            <p:ph type="sldNum" sz="quarter" idx="12"/>
-          </p:nvPr>
-        </p:nvSpPr>
-        <p:spPr/>
-        <p:txBody>
-          <a:bodyPr/>
-          <a:lstStyle/>
-          <a:p>
-            <a:fld id="{37290FF7-652B-4475-AEAB-8B1A5D23AE09}" type="slidenum">
-              <a:rPr lang="en-US" smtClean="0"/>
-              <a:t>10</a:t>
-            </a:fld>
-            <a:endParaRPr lang="en-US"/>
-          </a:p>
-        </p:txBody>
-      </p:sp>
-      <p:sp>
-        <p:nvSpPr>
-          <p:cNvPr id="5" name="Footer Placeholder 4"/>
-          <p:cNvSpPr>
-            <a:spLocks noGrp="1"/>
-          </p:cNvSpPr>
-          <p:nvPr>
-            <p:ph type="ftr" sz="quarter" idx="3"/>
-          </p:nvPr>
-        </p:nvSpPr>
-        <p:spPr/>
-        <p:txBody>
-          <a:bodyPr/>
-          <a:lstStyle/>
-          <a:p>
-            <a:r>
-              <a:rPr lang="en-US"/>
-              <a:t>Kwartler</a:t>
-            </a:r>
-            <a:endParaRPr lang="en-US" dirty="0"/>
-          </a:p>
-        </p:txBody>
-      </p:sp>
-      <p:sp>
-        <p:nvSpPr>
-          <p:cNvPr id="6" name="TextBox 5"/>
-          <p:cNvSpPr txBox="1"/>
-          <p:nvPr/>
-        </p:nvSpPr>
-        <p:spPr>
-          <a:xfrm>
-            <a:off x="362606" y="1371601"/>
-            <a:ext cx="2879314" cy="1200329"/>
-          </a:xfrm>
-          <a:prstGeom prst="rect">
-            <a:avLst/>
-          </a:prstGeom>
-          <a:noFill/>
-        </p:spPr>
-        <p:txBody>
-          <a:bodyPr wrap="none" rtlCol="0">
-            <a:spAutoFit/>
-          </a:bodyPr>
-          <a:lstStyle/>
-          <a:p>
-            <a:r>
-              <a:rPr lang="en-US" dirty="0">
-                <a:latin typeface="Consolas" panose="020B0609020204030204" pitchFamily="49" charset="0"/>
-                <a:cs typeface="Consolas" panose="020B0609020204030204" pitchFamily="49" charset="0"/>
-              </a:rPr>
-              <a:t>Library(spelling) </a:t>
-            </a:r>
-          </a:p>
-          <a:p>
-            <a:pPr marL="285750" indent="-285750">
-              <a:buFont typeface="Arial" panose="020B0604020202020204" pitchFamily="34" charset="0"/>
-              <a:buChar char="•"/>
-            </a:pPr>
-            <a:r>
-              <a:rPr lang="en-US" dirty="0" err="1">
-                <a:latin typeface="Consolas" panose="020B0609020204030204" pitchFamily="49" charset="0"/>
-                <a:cs typeface="Consolas" panose="020B0609020204030204" pitchFamily="49" charset="0"/>
-              </a:rPr>
-              <a:t>hunspell_check</a:t>
-            </a:r>
-            <a:r>
-              <a:rPr lang="en-US" dirty="0">
-                <a:latin typeface="Consolas" panose="020B0609020204030204" pitchFamily="49" charset="0"/>
-                <a:cs typeface="Consolas" panose="020B0609020204030204" pitchFamily="49" charset="0"/>
-              </a:rPr>
-              <a:t>(…)</a:t>
-            </a:r>
-          </a:p>
-          <a:p>
-            <a:pPr marL="285750" indent="-285750">
-              <a:buFont typeface="Arial" panose="020B0604020202020204" pitchFamily="34" charset="0"/>
-              <a:buChar char="•"/>
-            </a:pPr>
-            <a:r>
-              <a:rPr lang="en-US" dirty="0" err="1">
-                <a:latin typeface="Consolas" panose="020B0609020204030204" pitchFamily="49" charset="0"/>
-                <a:cs typeface="Consolas" panose="020B0609020204030204" pitchFamily="49" charset="0"/>
-              </a:rPr>
-              <a:t>hunspell_suggest</a:t>
-            </a:r>
-            <a:r>
-              <a:rPr lang="en-US" dirty="0">
-                <a:latin typeface="Consolas" panose="020B0609020204030204" pitchFamily="49" charset="0"/>
-                <a:cs typeface="Consolas" panose="020B0609020204030204" pitchFamily="49" charset="0"/>
-              </a:rPr>
-              <a:t>(…)</a:t>
-            </a:r>
-          </a:p>
-          <a:p>
-            <a:pPr marL="285750" indent="-285750">
-              <a:buFont typeface="Arial" panose="020B0604020202020204" pitchFamily="34" charset="0"/>
-              <a:buChar char="•"/>
-            </a:pPr>
-            <a:r>
-              <a:rPr lang="en-US" dirty="0" err="1">
-                <a:latin typeface="Consolas" panose="020B0609020204030204" pitchFamily="49" charset="0"/>
-                <a:cs typeface="Consolas" panose="020B0609020204030204" pitchFamily="49" charset="0"/>
-              </a:rPr>
-              <a:t>hunspell_analyze</a:t>
-            </a:r>
-            <a:r>
-              <a:rPr lang="en-US" dirty="0">
-                <a:latin typeface="Consolas" panose="020B0609020204030204" pitchFamily="49" charset="0"/>
-                <a:cs typeface="Consolas" panose="020B0609020204030204" pitchFamily="49" charset="0"/>
-              </a:rPr>
-              <a:t>(…)</a:t>
-            </a:r>
-          </a:p>
-        </p:txBody>
-      </p:sp>
-      <p:sp>
-        <p:nvSpPr>
-          <p:cNvPr id="7" name="TextBox 6"/>
-          <p:cNvSpPr txBox="1"/>
-          <p:nvPr/>
-        </p:nvSpPr>
-        <p:spPr>
-          <a:xfrm rot="19512593">
-            <a:off x="5125326" y="1792441"/>
-            <a:ext cx="2753280" cy="923330"/>
-          </a:xfrm>
-          <a:prstGeom prst="rect">
-            <a:avLst/>
-          </a:prstGeom>
-          <a:solidFill>
-            <a:srgbClr val="FFC000"/>
-          </a:solidFill>
-        </p:spPr>
-        <p:txBody>
-          <a:bodyPr wrap="square" rtlCol="0">
-            <a:spAutoFit/>
-          </a:bodyPr>
-          <a:lstStyle/>
-          <a:p>
-            <a:r>
-              <a:rPr lang="en-US" dirty="0"/>
-              <a:t>We will use in this course but </a:t>
-            </a:r>
-            <a:r>
-              <a:rPr lang="en-US" dirty="0" err="1"/>
-              <a:t>pg</a:t>
-            </a:r>
-            <a:r>
-              <a:rPr lang="en-US" dirty="0"/>
-              <a:t> 45 of the book has the </a:t>
-            </a:r>
-            <a:r>
-              <a:rPr lang="en-US" dirty="0" err="1"/>
-              <a:t>qdap</a:t>
-            </a:r>
-            <a:r>
-              <a:rPr lang="en-US" dirty="0"/>
-              <a:t> option</a:t>
-            </a:r>
-          </a:p>
-        </p:txBody>
-      </p:sp>
-      <p:sp>
-        <p:nvSpPr>
-          <p:cNvPr id="11" name="TextBox 10"/>
-          <p:cNvSpPr txBox="1"/>
-          <p:nvPr/>
-        </p:nvSpPr>
-        <p:spPr>
-          <a:xfrm>
-            <a:off x="268015" y="3121573"/>
-            <a:ext cx="8623738" cy="2031325"/>
-          </a:xfrm>
-          <a:prstGeom prst="rect">
-            <a:avLst/>
-          </a:prstGeom>
-          <a:noFill/>
-        </p:spPr>
-        <p:txBody>
-          <a:bodyPr wrap="square" rtlCol="0">
-            <a:spAutoFit/>
-          </a:bodyPr>
-          <a:lstStyle/>
-          <a:p>
-            <a:pPr marL="342900" indent="-342900">
-              <a:buFont typeface="+mj-lt"/>
-              <a:buAutoNum type="arabicPeriod"/>
-            </a:pPr>
-            <a:r>
-              <a:rPr lang="en-US" dirty="0"/>
-              <a:t>Check the terms</a:t>
-            </a:r>
-          </a:p>
-          <a:p>
-            <a:pPr marL="342900" indent="-342900">
-              <a:buFont typeface="+mj-lt"/>
-              <a:buAutoNum type="arabicPeriod"/>
-            </a:pPr>
-            <a:endParaRPr lang="en-US" dirty="0"/>
-          </a:p>
-          <a:p>
-            <a:pPr marL="342900" indent="-342900">
-              <a:buFont typeface="+mj-lt"/>
-              <a:buAutoNum type="arabicPeriod"/>
-            </a:pPr>
-            <a:r>
-              <a:rPr lang="en-US" dirty="0"/>
-              <a:t>Identify the suggestions</a:t>
-            </a:r>
-          </a:p>
-          <a:p>
-            <a:pPr marL="342900" indent="-342900">
-              <a:buFont typeface="+mj-lt"/>
-              <a:buAutoNum type="arabicPeriod"/>
-            </a:pPr>
-            <a:endParaRPr lang="en-US" dirty="0"/>
-          </a:p>
-          <a:p>
-            <a:pPr marL="342900" indent="-342900">
-              <a:buFont typeface="+mj-lt"/>
-              <a:buAutoNum type="arabicPeriod"/>
-            </a:pPr>
-            <a:r>
-              <a:rPr lang="en-US" dirty="0"/>
-              <a:t>Organize the suggestions into a lexicon </a:t>
-            </a:r>
-          </a:p>
-          <a:p>
-            <a:pPr marL="342900" indent="-342900">
-              <a:buFont typeface="+mj-lt"/>
-              <a:buAutoNum type="arabicPeriod"/>
-            </a:pPr>
-            <a:endParaRPr lang="en-US" dirty="0"/>
-          </a:p>
-          <a:p>
-            <a:pPr marL="342900" indent="-342900">
-              <a:buFont typeface="+mj-lt"/>
-              <a:buAutoNum type="arabicPeriod"/>
-            </a:pPr>
-            <a:r>
-              <a:rPr lang="en-US" dirty="0"/>
-              <a:t>Use a global substitution (</a:t>
-            </a:r>
-            <a:r>
-              <a:rPr lang="en-US" dirty="0" err="1"/>
-              <a:t>gsub</a:t>
-            </a:r>
-            <a:r>
-              <a:rPr lang="en-US" dirty="0"/>
-              <a:t>) to correct identified misspellings</a:t>
-            </a:r>
-          </a:p>
-        </p:txBody>
-      </p:sp>
-      <p:sp>
-        <p:nvSpPr>
-          <p:cNvPr id="12" name="Rectangle 11">
-            <a:extLst>
-              <a:ext uri="{FF2B5EF4-FFF2-40B4-BE49-F238E27FC236}">
-                <a16:creationId xmlns:a16="http://schemas.microsoft.com/office/drawing/2014/main" id="{CE6549BB-6AF5-468A-8D72-A45EED7452EF}"/>
-              </a:ext>
-            </a:extLst>
-          </p:cNvPr>
-          <p:cNvSpPr/>
-          <p:nvPr/>
-        </p:nvSpPr>
-        <p:spPr>
-          <a:xfrm>
-            <a:off x="228600" y="5455587"/>
-            <a:ext cx="8686800" cy="472252"/>
-          </a:xfrm>
-          <a:prstGeom prst="rect">
-            <a:avLst/>
-          </a:prstGeom>
-          <a:solidFill>
-            <a:schemeClr val="accent6"/>
-          </a:solidFill>
-          <a:ln>
-            <a:noFill/>
-          </a:ln>
-        </p:spPr>
-        <p:style>
-          <a:lnRef idx="2">
-            <a:schemeClr val="accent1">
-              <a:shade val="50000"/>
-            </a:schemeClr>
-          </a:lnRef>
-          <a:fillRef idx="1">
-            <a:schemeClr val="accent1"/>
-          </a:fillRef>
-          <a:effectRef idx="0">
-            <a:schemeClr val="accent1"/>
-          </a:effectRef>
-          <a:fontRef idx="minor">
-            <a:schemeClr val="lt1"/>
-          </a:fontRef>
-        </p:style>
-        <p:txBody>
-          <a:bodyPr rot="0" spcFirstLastPara="0" vertOverflow="overflow" horzOverflow="overflow" vert="horz" wrap="square" lIns="91440" tIns="45720" rIns="91440" bIns="45720" numCol="1" spcCol="0" rtlCol="0" fromWordArt="0" anchor="ctr" anchorCtr="0" forceAA="0" compatLnSpc="1">
-            <a:prstTxWarp prst="textNoShape">
-              <a:avLst/>
-            </a:prstTxWarp>
-            <a:noAutofit/>
-          </a:bodyPr>
-          <a:lstStyle/>
-          <a:p>
-            <a:r>
-              <a:rPr lang="en-US" dirty="0">
-                <a:solidFill>
-                  <a:schemeClr val="bg1"/>
-                </a:solidFill>
-              </a:rPr>
-              <a:t>Still uses the benefit of </a:t>
-            </a:r>
-            <a:r>
-              <a:rPr lang="en-US" dirty="0" err="1">
-                <a:solidFill>
-                  <a:schemeClr val="bg1"/>
-                </a:solidFill>
-              </a:rPr>
-              <a:t>hunspell</a:t>
-            </a:r>
-            <a:r>
-              <a:rPr lang="en-US" dirty="0">
-                <a:solidFill>
-                  <a:schemeClr val="bg1"/>
-                </a:solidFill>
-              </a:rPr>
-              <a:t> but is easier to interact with.  </a:t>
-            </a:r>
-          </a:p>
-        </p:txBody>
-      </p:sp>
-      <p:cxnSp>
-        <p:nvCxnSpPr>
-          <p:cNvPr id="10" name="Straight Connector 9">
-            <a:extLst>
-              <a:ext uri="{FF2B5EF4-FFF2-40B4-BE49-F238E27FC236}">
-                <a16:creationId xmlns:a16="http://schemas.microsoft.com/office/drawing/2014/main" id="{1E1D199A-FC2C-014D-961F-D31B0E03CD83}"/>
-              </a:ext>
-            </a:extLst>
-          </p:cNvPr>
-          <p:cNvCxnSpPr/>
-          <p:nvPr/>
-        </p:nvCxnSpPr>
-        <p:spPr>
-          <a:xfrm>
-            <a:off x="6798363" y="6549885"/>
-            <a:ext cx="0" cy="182880"/>
-          </a:xfrm>
-          <a:prstGeom prst="line">
-            <a:avLst/>
-          </a:prstGeom>
-          <a:ln>
-            <a:solidFill>
-              <a:schemeClr val="bg1">
-                <a:lumMod val="85000"/>
-              </a:schemeClr>
-            </a:solidFill>
-          </a:ln>
-        </p:spPr>
-        <p:style>
-          <a:lnRef idx="1">
-            <a:schemeClr val="accent1"/>
-          </a:lnRef>
-          <a:fillRef idx="0">
-            <a:schemeClr val="accent1"/>
-          </a:fillRef>
-          <a:effectRef idx="0">
-            <a:schemeClr val="accent1"/>
-          </a:effectRef>
-          <a:fontRef idx="minor">
-            <a:schemeClr val="tx1"/>
-          </a:fontRef>
-        </p:style>
-      </p:cxnSp>
-      <p:cxnSp>
-        <p:nvCxnSpPr>
-          <p:cNvPr id="13" name="Straight Connector 12">
-            <a:extLst>
-              <a:ext uri="{FF2B5EF4-FFF2-40B4-BE49-F238E27FC236}">
-                <a16:creationId xmlns:a16="http://schemas.microsoft.com/office/drawing/2014/main" id="{31A832B3-A5A1-694E-A5A4-7A7B77248328}"/>
-              </a:ext>
-            </a:extLst>
-          </p:cNvPr>
-          <p:cNvCxnSpPr/>
-          <p:nvPr/>
-        </p:nvCxnSpPr>
-        <p:spPr>
-          <a:xfrm>
-            <a:off x="7076661" y="4664763"/>
-            <a:ext cx="182880" cy="0"/>
-          </a:xfrm>
-          <a:prstGeom prst="line">
-            <a:avLst/>
-          </a:prstGeom>
-          <a:ln>
-            <a:solidFill>
-              <a:schemeClr val="bg1">
-                <a:lumMod val="85000"/>
-              </a:schemeClr>
-            </a:solidFill>
-          </a:ln>
-        </p:spPr>
-        <p:style>
-          <a:lnRef idx="1">
-            <a:schemeClr val="accent1"/>
-          </a:lnRef>
-          <a:fillRef idx="0">
-            <a:schemeClr val="accent1"/>
-          </a:fillRef>
-          <a:effectRef idx="0">
-            <a:schemeClr val="accent1"/>
-          </a:effectRef>
-          <a:fontRef idx="minor">
-            <a:schemeClr val="tx1"/>
-          </a:fontRef>
-        </p:style>
-      </p:cxnSp>
-    </p:spTree>
-    <p:extLst>
-      <p:ext uri="{BB962C8B-B14F-4D97-AF65-F5344CB8AC3E}">
-        <p14:creationId xmlns:p14="http://schemas.microsoft.com/office/powerpoint/2010/main" val="2168354648"/>
-      </p:ext>
-    </p:extLst>
-  </p:cSld>
-  <p:clrMapOvr>
-    <a:masterClrMapping/>
-  </p:clrMapOvr>
-</p:sld>
-</file>
-
-<file path=ppt/slides/slide11.xml><?xml version="1.0" encoding="utf-8"?>
-<p:sld xmlns:a="http://schemas.openxmlformats.org/drawingml/2006/main" xmlns:r="http://schemas.openxmlformats.org/officeDocument/2006/relationships" xmlns:p="http://schemas.openxmlformats.org/presentationml/2006/main">
-  <p:cSld>
-    <p:spTree>
-      <p:nvGrpSpPr>
-        <p:cNvPr id="1" name=""/>
-        <p:cNvGrpSpPr/>
-        <p:nvPr/>
-      </p:nvGrpSpPr>
-      <p:grpSpPr>
-        <a:xfrm>
-          <a:off x="0" y="0"/>
-          <a:ext cx="0" cy="0"/>
-          <a:chOff x="0" y="0"/>
-          <a:chExt cx="0" cy="0"/>
-        </a:xfrm>
-      </p:grpSpPr>
-      <p:sp>
-        <p:nvSpPr>
-          <p:cNvPr id="2" name="Date Placeholder 1"/>
-          <p:cNvSpPr>
-            <a:spLocks noGrp="1"/>
-          </p:cNvSpPr>
-          <p:nvPr>
-            <p:ph type="dt" sz="half" idx="10"/>
-          </p:nvPr>
-        </p:nvSpPr>
-        <p:spPr/>
-        <p:txBody>
-          <a:bodyPr/>
-          <a:lstStyle/>
-          <a:p>
-            <a:fld id="{6700A58B-DD98-43D0-B791-721480A02982}" type="datetime1">
-              <a:rPr lang="en-US" smtClean="0"/>
-              <a:t>1/10/21</a:t>
+              <a:t>1/23/21</a:t>
             </a:fld>
             <a:endParaRPr lang="en-US"/>
           </a:p>
@@ -4837,7 +4319,7 @@
           <a:p>
             <a:fld id="{37290FF7-652B-4475-AEAB-8B1A5D23AE09}" type="slidenum">
               <a:rPr lang="en-US" smtClean="0"/>
-              <a:t>11</a:t>
+              <a:t>10</a:t>
             </a:fld>
             <a:endParaRPr lang="en-US"/>
           </a:p>
@@ -5082,220 +4564,6 @@
 </file>
 
 <file path=ppt/slides/slide2.xml><?xml version="1.0" encoding="utf-8"?>
-<p:sld xmlns:a="http://schemas.openxmlformats.org/drawingml/2006/main" xmlns:r="http://schemas.openxmlformats.org/officeDocument/2006/relationships" xmlns:p="http://schemas.openxmlformats.org/presentationml/2006/main">
-  <p:cSld>
-    <p:spTree>
-      <p:nvGrpSpPr>
-        <p:cNvPr id="1" name=""/>
-        <p:cNvGrpSpPr/>
-        <p:nvPr/>
-      </p:nvGrpSpPr>
-      <p:grpSpPr>
-        <a:xfrm>
-          <a:off x="0" y="0"/>
-          <a:ext cx="0" cy="0"/>
-          <a:chOff x="0" y="0"/>
-          <a:chExt cx="0" cy="0"/>
-        </a:xfrm>
-      </p:grpSpPr>
-      <p:sp>
-        <p:nvSpPr>
-          <p:cNvPr id="2" name="Title 1">
-            <a:extLst>
-              <a:ext uri="{FF2B5EF4-FFF2-40B4-BE49-F238E27FC236}">
-                <a16:creationId xmlns:a16="http://schemas.microsoft.com/office/drawing/2014/main" id="{48AD0BD4-6FFF-AF42-9A45-B1D783D62F33}"/>
-              </a:ext>
-            </a:extLst>
-          </p:cNvPr>
-          <p:cNvSpPr>
-            <a:spLocks noGrp="1"/>
-          </p:cNvSpPr>
-          <p:nvPr>
-            <p:ph type="title"/>
-          </p:nvPr>
-        </p:nvSpPr>
-        <p:spPr/>
-        <p:txBody>
-          <a:bodyPr/>
-          <a:lstStyle/>
-          <a:p>
-            <a:endParaRPr lang="en-US"/>
-          </a:p>
-        </p:txBody>
-      </p:sp>
-      <p:sp>
-        <p:nvSpPr>
-          <p:cNvPr id="3" name="Content Placeholder 2">
-            <a:extLst>
-              <a:ext uri="{FF2B5EF4-FFF2-40B4-BE49-F238E27FC236}">
-                <a16:creationId xmlns:a16="http://schemas.microsoft.com/office/drawing/2014/main" id="{9D620F3C-5F28-1B4D-919B-9168B11B2125}"/>
-              </a:ext>
-            </a:extLst>
-          </p:cNvPr>
-          <p:cNvSpPr>
-            <a:spLocks noGrp="1"/>
-          </p:cNvSpPr>
-          <p:nvPr>
-            <p:ph idx="1"/>
-          </p:nvPr>
-        </p:nvSpPr>
-        <p:spPr/>
-        <p:txBody>
-          <a:bodyPr/>
-          <a:lstStyle/>
-          <a:p>
-            <a:endParaRPr lang="en-US"/>
-          </a:p>
-        </p:txBody>
-      </p:sp>
-      <p:sp>
-        <p:nvSpPr>
-          <p:cNvPr id="4" name="Date Placeholder 3">
-            <a:extLst>
-              <a:ext uri="{FF2B5EF4-FFF2-40B4-BE49-F238E27FC236}">
-                <a16:creationId xmlns:a16="http://schemas.microsoft.com/office/drawing/2014/main" id="{2D58A779-0E36-1D48-BC17-FE82ED3E1FDB}"/>
-              </a:ext>
-            </a:extLst>
-          </p:cNvPr>
-          <p:cNvSpPr>
-            <a:spLocks noGrp="1"/>
-          </p:cNvSpPr>
-          <p:nvPr>
-            <p:ph type="dt" sz="half" idx="10"/>
-          </p:nvPr>
-        </p:nvSpPr>
-        <p:spPr/>
-        <p:txBody>
-          <a:bodyPr/>
-          <a:lstStyle/>
-          <a:p>
-            <a:fld id="{D753EFC8-4232-4598-94F6-94C0EBAFC469}" type="datetime1">
-              <a:rPr lang="en-US" smtClean="0"/>
-              <a:t>1/10/21</a:t>
-            </a:fld>
-            <a:endParaRPr lang="en-US"/>
-          </a:p>
-        </p:txBody>
-      </p:sp>
-      <p:sp>
-        <p:nvSpPr>
-          <p:cNvPr id="5" name="Slide Number Placeholder 4">
-            <a:extLst>
-              <a:ext uri="{FF2B5EF4-FFF2-40B4-BE49-F238E27FC236}">
-                <a16:creationId xmlns:a16="http://schemas.microsoft.com/office/drawing/2014/main" id="{676D020C-585E-2240-94D3-278586C7F7C4}"/>
-              </a:ext>
-            </a:extLst>
-          </p:cNvPr>
-          <p:cNvSpPr>
-            <a:spLocks noGrp="1"/>
-          </p:cNvSpPr>
-          <p:nvPr>
-            <p:ph type="sldNum" sz="quarter" idx="12"/>
-          </p:nvPr>
-        </p:nvSpPr>
-        <p:spPr/>
-        <p:txBody>
-          <a:bodyPr/>
-          <a:lstStyle/>
-          <a:p>
-            <a:fld id="{37290FF7-652B-4475-AEAB-8B1A5D23AE09}" type="slidenum">
-              <a:rPr lang="en-US" smtClean="0"/>
-              <a:t>2</a:t>
-            </a:fld>
-            <a:endParaRPr lang="en-US"/>
-          </a:p>
-        </p:txBody>
-      </p:sp>
-      <p:sp>
-        <p:nvSpPr>
-          <p:cNvPr id="6" name="Footer Placeholder 5">
-            <a:extLst>
-              <a:ext uri="{FF2B5EF4-FFF2-40B4-BE49-F238E27FC236}">
-                <a16:creationId xmlns:a16="http://schemas.microsoft.com/office/drawing/2014/main" id="{ED409CC0-C0E0-3A44-966C-A5F0E3C8BC7F}"/>
-              </a:ext>
-            </a:extLst>
-          </p:cNvPr>
-          <p:cNvSpPr>
-            <a:spLocks noGrp="1"/>
-          </p:cNvSpPr>
-          <p:nvPr>
-            <p:ph type="ftr" sz="quarter" idx="3"/>
-          </p:nvPr>
-        </p:nvSpPr>
-        <p:spPr/>
-        <p:txBody>
-          <a:bodyPr/>
-          <a:lstStyle/>
-          <a:p>
-            <a:r>
-              <a:rPr lang="en-US"/>
-              <a:t>Kwartler</a:t>
-            </a:r>
-            <a:endParaRPr lang="en-US" dirty="0"/>
-          </a:p>
-        </p:txBody>
-      </p:sp>
-      <p:pic>
-        <p:nvPicPr>
-          <p:cNvPr id="1026" name="Picture 2" descr="50+ Please take attendance ideas | attendance, teacher humor, teaching humor">
-            <a:extLst>
-              <a:ext uri="{FF2B5EF4-FFF2-40B4-BE49-F238E27FC236}">
-                <a16:creationId xmlns:a16="http://schemas.microsoft.com/office/drawing/2014/main" id="{82C612BA-4E15-1449-AD96-FA4CD9B6C148}"/>
-              </a:ext>
-            </a:extLst>
-          </p:cNvPr>
-          <p:cNvPicPr>
-            <a:picLocks noChangeAspect="1" noChangeArrowheads="1"/>
-          </p:cNvPicPr>
-          <p:nvPr/>
-        </p:nvPicPr>
-        <p:blipFill>
-          <a:blip r:embed="rId2">
-            <a:extLst>
-              <a:ext uri="{28A0092B-C50C-407E-A947-70E740481C1C}">
-                <a14:useLocalDpi xmlns:a14="http://schemas.microsoft.com/office/drawing/2010/main" val="0"/>
-              </a:ext>
-            </a:extLst>
-          </a:blip>
-          <a:srcRect/>
-          <a:stretch>
-            <a:fillRect/>
-          </a:stretch>
-        </p:blipFill>
-        <p:spPr bwMode="auto">
-          <a:xfrm>
-            <a:off x="101600" y="260350"/>
-            <a:ext cx="8940800" cy="6337300"/>
-          </a:xfrm>
-          <a:prstGeom prst="rect">
-            <a:avLst/>
-          </a:prstGeom>
-          <a:noFill/>
-          <a:extLst>
-            <a:ext uri="{909E8E84-426E-40DD-AFC4-6F175D3DCCD1}">
-              <a14:hiddenFill xmlns:a14="http://schemas.microsoft.com/office/drawing/2010/main">
-                <a:solidFill>
-                  <a:srgbClr val="FFFFFF"/>
-                </a:solidFill>
-              </a14:hiddenFill>
-            </a:ext>
-          </a:extLst>
-        </p:spPr>
-      </p:pic>
-    </p:spTree>
-    <p:extLst>
-      <p:ext uri="{BB962C8B-B14F-4D97-AF65-F5344CB8AC3E}">
-        <p14:creationId xmlns:p14="http://schemas.microsoft.com/office/powerpoint/2010/main" val="3308138921"/>
-      </p:ext>
-    </p:extLst>
-  </p:cSld>
-  <p:clrMapOvr>
-    <a:masterClrMapping/>
-  </p:clrMapOvr>
-</p:sld>
-</file>
-
-<file path=ppt/slides/slide3.xml><?xml version="1.0" encoding="utf-8"?>
 <p:sld xmlns:a="http://schemas.openxmlformats.org/drawingml/2006/main" xmlns:r="http://schemas.openxmlformats.org/officeDocument/2006/relationships" xmlns:p="http://schemas.openxmlformats.org/presentationml/2006/main">
   <p:cSld>
     <p:spTree>
@@ -5646,7 +4914,7 @@
           <a:p>
             <a:fld id="{6700A58B-DD98-43D0-B791-721480A02982}" type="datetime1">
               <a:rPr lang="en-US" smtClean="0"/>
-              <a:t>1/10/21</a:t>
+              <a:t>1/23/21</a:t>
             </a:fld>
             <a:endParaRPr lang="en-US"/>
           </a:p>
@@ -5812,7 +5080,7 @@
 </p:sld>
 </file>
 
-<file path=ppt/slides/slide4.xml><?xml version="1.0" encoding="utf-8"?>
+<file path=ppt/slides/slide3.xml><?xml version="1.0" encoding="utf-8"?>
 <p:sld xmlns:a="http://schemas.openxmlformats.org/drawingml/2006/main" xmlns:r="http://schemas.openxmlformats.org/officeDocument/2006/relationships" xmlns:p="http://schemas.openxmlformats.org/presentationml/2006/main">
   <p:cSld>
     <p:spTree>
@@ -5846,7 +5114,7 @@
           <a:p>
             <a:fld id="{6700A58B-DD98-43D0-B791-721480A02982}" type="datetime1">
               <a:rPr lang="en-US" smtClean="0"/>
-              <a:t>1/10/21</a:t>
+              <a:t>1/23/21</a:t>
             </a:fld>
             <a:endParaRPr lang="en-US"/>
           </a:p>
@@ -5892,7 +5160,7 @@
           <a:p>
             <a:fld id="{37290FF7-652B-4475-AEAB-8B1A5D23AE09}" type="slidenum">
               <a:rPr lang="en-US" smtClean="0"/>
-              <a:t>4</a:t>
+              <a:t>3</a:t>
             </a:fld>
             <a:endParaRPr lang="en-US"/>
           </a:p>
@@ -6881,7 +6149,7 @@
 </p:sld>
 </file>
 
-<file path=ppt/slides/slide5.xml><?xml version="1.0" encoding="utf-8"?>
+<file path=ppt/slides/slide4.xml><?xml version="1.0" encoding="utf-8"?>
 <p:sld xmlns:a="http://schemas.openxmlformats.org/drawingml/2006/main" xmlns:r="http://schemas.openxmlformats.org/officeDocument/2006/relationships" xmlns:p="http://schemas.openxmlformats.org/presentationml/2006/main">
   <p:cSld>
     <p:spTree>
@@ -6915,7 +6183,7 @@
           <a:p>
             <a:fld id="{6700A58B-DD98-43D0-B791-721480A02982}" type="datetime1">
               <a:rPr lang="en-US" smtClean="0"/>
-              <a:t>1/10/21</a:t>
+              <a:t>1/23/21</a:t>
             </a:fld>
             <a:endParaRPr lang="en-US"/>
           </a:p>
@@ -6955,7 +6223,7 @@
             </a:r>
             <a:r>
               <a:rPr lang="en-US" dirty="0" err="1"/>
-              <a:t>B_Strings.R</a:t>
+              <a:t>A_Strings.R</a:t>
             </a:r>
             <a:br>
               <a:rPr lang="en-US" dirty="0"/>
@@ -6981,7 +6249,7 @@
           <a:p>
             <a:fld id="{37290FF7-652B-4475-AEAB-8B1A5D23AE09}" type="slidenum">
               <a:rPr lang="en-US" smtClean="0"/>
-              <a:t>5</a:t>
+              <a:t>4</a:t>
             </a:fld>
             <a:endParaRPr lang="en-US"/>
           </a:p>
@@ -7216,6 +6484,295 @@
     <p:extLst>
       <p:ext uri="{BB962C8B-B14F-4D97-AF65-F5344CB8AC3E}">
         <p14:creationId xmlns:p14="http://schemas.microsoft.com/office/powerpoint/2010/main" val="1413151419"/>
+      </p:ext>
+    </p:extLst>
+  </p:cSld>
+  <p:clrMapOvr>
+    <a:masterClrMapping/>
+  </p:clrMapOvr>
+</p:sld>
+</file>
+
+<file path=ppt/slides/slide5.xml><?xml version="1.0" encoding="utf-8"?>
+<p:sld xmlns:a="http://schemas.openxmlformats.org/drawingml/2006/main" xmlns:r="http://schemas.openxmlformats.org/officeDocument/2006/relationships" xmlns:p="http://schemas.openxmlformats.org/presentationml/2006/main">
+  <p:cSld>
+    <p:spTree>
+      <p:nvGrpSpPr>
+        <p:cNvPr id="1" name=""/>
+        <p:cNvGrpSpPr/>
+        <p:nvPr/>
+      </p:nvGrpSpPr>
+      <p:grpSpPr>
+        <a:xfrm>
+          <a:off x="0" y="0"/>
+          <a:ext cx="0" cy="0"/>
+          <a:chOff x="0" y="0"/>
+          <a:chExt cx="0" cy="0"/>
+        </a:xfrm>
+      </p:grpSpPr>
+      <p:sp>
+        <p:nvSpPr>
+          <p:cNvPr id="2" name="Date Placeholder 1"/>
+          <p:cNvSpPr>
+            <a:spLocks noGrp="1"/>
+          </p:cNvSpPr>
+          <p:nvPr>
+            <p:ph type="dt" sz="half" idx="10"/>
+          </p:nvPr>
+        </p:nvSpPr>
+        <p:spPr/>
+        <p:txBody>
+          <a:bodyPr/>
+          <a:lstStyle/>
+          <a:p>
+            <a:fld id="{6700A58B-DD98-43D0-B791-721480A02982}" type="datetime1">
+              <a:rPr lang="en-US" smtClean="0"/>
+              <a:t>1/23/21</a:t>
+            </a:fld>
+            <a:endParaRPr lang="en-US"/>
+          </a:p>
+        </p:txBody>
+      </p:sp>
+      <p:sp>
+        <p:nvSpPr>
+          <p:cNvPr id="3" name="Title 2"/>
+          <p:cNvSpPr>
+            <a:spLocks noGrp="1"/>
+          </p:cNvSpPr>
+          <p:nvPr>
+            <p:ph type="title"/>
+          </p:nvPr>
+        </p:nvSpPr>
+        <p:spPr>
+          <a:xfrm>
+            <a:off x="0" y="318234"/>
+            <a:ext cx="8515350" cy="591477"/>
+          </a:xfrm>
+        </p:spPr>
+        <p:txBody>
+          <a:bodyPr/>
+          <a:lstStyle/>
+          <a:p>
+            <a:r>
+              <a:rPr lang="en-US" sz="2800" dirty="0"/>
+              <a:t>How about some additional strings?  Yippee!!</a:t>
+            </a:r>
+          </a:p>
+        </p:txBody>
+      </p:sp>
+      <p:sp>
+        <p:nvSpPr>
+          <p:cNvPr id="4" name="Slide Number Placeholder 3"/>
+          <p:cNvSpPr>
+            <a:spLocks noGrp="1"/>
+          </p:cNvSpPr>
+          <p:nvPr>
+            <p:ph type="sldNum" sz="quarter" idx="12"/>
+          </p:nvPr>
+        </p:nvSpPr>
+        <p:spPr/>
+        <p:txBody>
+          <a:bodyPr/>
+          <a:lstStyle/>
+          <a:p>
+            <a:fld id="{37290FF7-652B-4475-AEAB-8B1A5D23AE09}" type="slidenum">
+              <a:rPr lang="en-US" smtClean="0"/>
+              <a:t>5</a:t>
+            </a:fld>
+            <a:endParaRPr lang="en-US"/>
+          </a:p>
+        </p:txBody>
+      </p:sp>
+      <p:cxnSp>
+        <p:nvCxnSpPr>
+          <p:cNvPr id="10" name="Straight Connector 9">
+            <a:extLst>
+              <a:ext uri="{FF2B5EF4-FFF2-40B4-BE49-F238E27FC236}">
+                <a16:creationId xmlns:a16="http://schemas.microsoft.com/office/drawing/2014/main" id="{E27EE9E3-0DA6-7D46-9D6B-C8A5EBC26462}"/>
+              </a:ext>
+            </a:extLst>
+          </p:cNvPr>
+          <p:cNvCxnSpPr/>
+          <p:nvPr/>
+        </p:nvCxnSpPr>
+        <p:spPr>
+          <a:xfrm>
+            <a:off x="6798363" y="6549885"/>
+            <a:ext cx="0" cy="182880"/>
+          </a:xfrm>
+          <a:prstGeom prst="line">
+            <a:avLst/>
+          </a:prstGeom>
+          <a:ln>
+            <a:solidFill>
+              <a:schemeClr val="bg1">
+                <a:lumMod val="85000"/>
+              </a:schemeClr>
+            </a:solidFill>
+          </a:ln>
+        </p:spPr>
+        <p:style>
+          <a:lnRef idx="1">
+            <a:schemeClr val="accent1"/>
+          </a:lnRef>
+          <a:fillRef idx="0">
+            <a:schemeClr val="accent1"/>
+          </a:fillRef>
+          <a:effectRef idx="0">
+            <a:schemeClr val="accent1"/>
+          </a:effectRef>
+          <a:fontRef idx="minor">
+            <a:schemeClr val="tx1"/>
+          </a:fontRef>
+        </p:style>
+      </p:cxnSp>
+      <p:cxnSp>
+        <p:nvCxnSpPr>
+          <p:cNvPr id="11" name="Straight Connector 10">
+            <a:extLst>
+              <a:ext uri="{FF2B5EF4-FFF2-40B4-BE49-F238E27FC236}">
+                <a16:creationId xmlns:a16="http://schemas.microsoft.com/office/drawing/2014/main" id="{041BA0E9-D4C1-2B41-9C2A-AF768E5CB01D}"/>
+              </a:ext>
+            </a:extLst>
+          </p:cNvPr>
+          <p:cNvCxnSpPr/>
+          <p:nvPr/>
+        </p:nvCxnSpPr>
+        <p:spPr>
+          <a:xfrm>
+            <a:off x="7076661" y="4664763"/>
+            <a:ext cx="182880" cy="0"/>
+          </a:xfrm>
+          <a:prstGeom prst="line">
+            <a:avLst/>
+          </a:prstGeom>
+          <a:ln>
+            <a:solidFill>
+              <a:schemeClr val="bg1">
+                <a:lumMod val="85000"/>
+              </a:schemeClr>
+            </a:solidFill>
+          </a:ln>
+        </p:spPr>
+        <p:style>
+          <a:lnRef idx="1">
+            <a:schemeClr val="accent1"/>
+          </a:lnRef>
+          <a:fillRef idx="0">
+            <a:schemeClr val="accent1"/>
+          </a:fillRef>
+          <a:effectRef idx="0">
+            <a:schemeClr val="accent1"/>
+          </a:effectRef>
+          <a:fontRef idx="minor">
+            <a:schemeClr val="tx1"/>
+          </a:fontRef>
+        </p:style>
+      </p:cxnSp>
+      <p:sp>
+        <p:nvSpPr>
+          <p:cNvPr id="5" name="TextBox 4">
+            <a:extLst>
+              <a:ext uri="{FF2B5EF4-FFF2-40B4-BE49-F238E27FC236}">
+                <a16:creationId xmlns:a16="http://schemas.microsoft.com/office/drawing/2014/main" id="{FCFF571F-07A2-F544-B376-7CE08D7387A8}"/>
+              </a:ext>
+            </a:extLst>
+          </p:cNvPr>
+          <p:cNvSpPr txBox="1"/>
+          <p:nvPr/>
+        </p:nvSpPr>
+        <p:spPr>
+          <a:xfrm>
+            <a:off x="296884" y="1603169"/>
+            <a:ext cx="1839799" cy="369332"/>
+          </a:xfrm>
+          <a:prstGeom prst="rect">
+            <a:avLst/>
+          </a:prstGeom>
+          <a:noFill/>
+        </p:spPr>
+        <p:txBody>
+          <a:bodyPr wrap="none" rtlCol="0">
+            <a:spAutoFit/>
+          </a:bodyPr>
+          <a:lstStyle/>
+          <a:p>
+            <a:r>
+              <a:rPr lang="en-US" dirty="0" err="1"/>
+              <a:t>B_more_strings.R</a:t>
+            </a:r>
+            <a:endParaRPr lang="en-US" dirty="0"/>
+          </a:p>
+        </p:txBody>
+      </p:sp>
+      <p:pic>
+        <p:nvPicPr>
+          <p:cNvPr id="6" name="Picture 5">
+            <a:extLst>
+              <a:ext uri="{FF2B5EF4-FFF2-40B4-BE49-F238E27FC236}">
+                <a16:creationId xmlns:a16="http://schemas.microsoft.com/office/drawing/2014/main" id="{E69103CE-72B5-3248-B704-E3AD01645FF2}"/>
+              </a:ext>
+            </a:extLst>
+          </p:cNvPr>
+          <p:cNvPicPr>
+            <a:picLocks noChangeAspect="1"/>
+          </p:cNvPicPr>
+          <p:nvPr/>
+        </p:nvPicPr>
+        <p:blipFill>
+          <a:blip r:embed="rId2"/>
+          <a:stretch>
+            <a:fillRect/>
+          </a:stretch>
+        </p:blipFill>
+        <p:spPr>
+          <a:xfrm>
+            <a:off x="862149" y="2635249"/>
+            <a:ext cx="4979851" cy="3112407"/>
+          </a:xfrm>
+          <a:prstGeom prst="rect">
+            <a:avLst/>
+          </a:prstGeom>
+        </p:spPr>
+      </p:pic>
+      <p:sp>
+        <p:nvSpPr>
+          <p:cNvPr id="12" name="Footer Placeholder 4">
+            <a:extLst>
+              <a:ext uri="{FF2B5EF4-FFF2-40B4-BE49-F238E27FC236}">
+                <a16:creationId xmlns:a16="http://schemas.microsoft.com/office/drawing/2014/main" id="{0800008A-AEB6-1C48-ABED-B835A2564E4F}"/>
+              </a:ext>
+            </a:extLst>
+          </p:cNvPr>
+          <p:cNvSpPr>
+            <a:spLocks noGrp="1"/>
+          </p:cNvSpPr>
+          <p:nvPr>
+            <p:ph type="ftr" sz="quarter" idx="3"/>
+          </p:nvPr>
+        </p:nvSpPr>
+        <p:spPr>
+          <a:xfrm>
+            <a:off x="3028950" y="6356351"/>
+            <a:ext cx="3086100" cy="365125"/>
+          </a:xfrm>
+        </p:spPr>
+        <p:txBody>
+          <a:bodyPr/>
+          <a:lstStyle/>
+          <a:p>
+            <a:r>
+              <a:rPr lang="en-US"/>
+              <a:t>Kwartler</a:t>
+            </a:r>
+            <a:endParaRPr lang="en-US" dirty="0"/>
+          </a:p>
+        </p:txBody>
+      </p:sp>
+    </p:spTree>
+    <p:extLst>
+      <p:ext uri="{BB962C8B-B14F-4D97-AF65-F5344CB8AC3E}">
+        <p14:creationId xmlns:p14="http://schemas.microsoft.com/office/powerpoint/2010/main" val="736318942"/>
       </p:ext>
     </p:extLst>
   </p:cSld>
@@ -7259,7 +6816,7 @@
           <a:p>
             <a:fld id="{6700A58B-DD98-43D0-B791-721480A02982}" type="datetime1">
               <a:rPr lang="en-US" smtClean="0"/>
-              <a:t>1/10/21</a:t>
+              <a:t>1/23/21</a:t>
             </a:fld>
             <a:endParaRPr lang="en-US"/>
           </a:p>
@@ -7275,19 +6832,14 @@
             <p:ph type="title"/>
           </p:nvPr>
         </p:nvSpPr>
-        <p:spPr>
-          <a:xfrm>
-            <a:off x="0" y="318234"/>
-            <a:ext cx="8515350" cy="591477"/>
-          </a:xfrm>
-        </p:spPr>
+        <p:spPr/>
         <p:txBody>
           <a:bodyPr/>
           <a:lstStyle/>
           <a:p>
             <a:r>
-              <a:rPr lang="en-US" sz="2800" dirty="0"/>
-              <a:t>How about some additional strings?  Yippee!!</a:t>
+              <a:rPr lang="en-US" dirty="0"/>
+              <a:t>What about misspelling?</a:t>
             </a:r>
           </a:p>
         </p:txBody>
@@ -7315,12 +6867,129 @@
           </a:p>
         </p:txBody>
       </p:sp>
+      <p:sp>
+        <p:nvSpPr>
+          <p:cNvPr id="5" name="Footer Placeholder 4"/>
+          <p:cNvSpPr>
+            <a:spLocks noGrp="1"/>
+          </p:cNvSpPr>
+          <p:nvPr>
+            <p:ph type="ftr" sz="quarter" idx="3"/>
+          </p:nvPr>
+        </p:nvSpPr>
+        <p:spPr/>
+        <p:txBody>
+          <a:bodyPr/>
+          <a:lstStyle/>
+          <a:p>
+            <a:r>
+              <a:rPr lang="en-US"/>
+              <a:t>Kwartler</a:t>
+            </a:r>
+            <a:endParaRPr lang="en-US" dirty="0"/>
+          </a:p>
+        </p:txBody>
+      </p:sp>
+      <p:pic>
+        <p:nvPicPr>
+          <p:cNvPr id="2050" name="Picture 2" descr="Image result for misspelling meme"/>
+          <p:cNvPicPr>
+            <a:picLocks noChangeAspect="1" noChangeArrowheads="1"/>
+          </p:cNvPicPr>
+          <p:nvPr/>
+        </p:nvPicPr>
+        <p:blipFill>
+          <a:blip r:embed="rId2">
+            <a:extLst>
+              <a:ext uri="{28A0092B-C50C-407E-A947-70E740481C1C}">
+                <a14:useLocalDpi xmlns:a14="http://schemas.microsoft.com/office/drawing/2010/main" val="0"/>
+              </a:ext>
+            </a:extLst>
+          </a:blip>
+          <a:srcRect/>
+          <a:stretch>
+            <a:fillRect/>
+          </a:stretch>
+        </p:blipFill>
+        <p:spPr bwMode="auto">
+          <a:xfrm>
+            <a:off x="313231" y="1261241"/>
+            <a:ext cx="3570500" cy="4477407"/>
+          </a:xfrm>
+          <a:prstGeom prst="rect">
+            <a:avLst/>
+          </a:prstGeom>
+          <a:noFill/>
+          <a:extLst>
+            <a:ext uri="{909E8E84-426E-40DD-AFC4-6F175D3DCCD1}">
+              <a14:hiddenFill xmlns:a14="http://schemas.microsoft.com/office/drawing/2010/main">
+                <a:solidFill>
+                  <a:srgbClr val="FFFFFF"/>
+                </a:solidFill>
+              </a14:hiddenFill>
+            </a:ext>
+          </a:extLst>
+        </p:spPr>
+      </p:pic>
+      <p:sp>
+        <p:nvSpPr>
+          <p:cNvPr id="6" name="TextBox 5"/>
+          <p:cNvSpPr txBox="1"/>
+          <p:nvPr/>
+        </p:nvSpPr>
+        <p:spPr>
+          <a:xfrm>
+            <a:off x="4776952" y="2522483"/>
+            <a:ext cx="3334503" cy="1569660"/>
+          </a:xfrm>
+          <a:prstGeom prst="rect">
+            <a:avLst/>
+          </a:prstGeom>
+          <a:noFill/>
+        </p:spPr>
+        <p:txBody>
+          <a:bodyPr wrap="none" rtlCol="0">
+            <a:spAutoFit/>
+          </a:bodyPr>
+          <a:lstStyle/>
+          <a:p>
+            <a:pPr marL="285750" indent="-285750">
+              <a:buFont typeface="Arial" panose="020B0604020202020204" pitchFamily="34" charset="0"/>
+              <a:buChar char="•"/>
+            </a:pPr>
+            <a:r>
+              <a:rPr lang="en-US" sz="3200" dirty="0"/>
+              <a:t>Prevalent</a:t>
+            </a:r>
+          </a:p>
+          <a:p>
+            <a:pPr marL="285750" indent="-285750">
+              <a:buFont typeface="Arial" panose="020B0604020202020204" pitchFamily="34" charset="0"/>
+              <a:buChar char="•"/>
+            </a:pPr>
+            <a:r>
+              <a:rPr lang="en-US" sz="3200" dirty="0"/>
+              <a:t>Painful to correct</a:t>
+            </a:r>
+          </a:p>
+          <a:p>
+            <a:pPr marL="285750" indent="-285750">
+              <a:buFont typeface="Arial" panose="020B0604020202020204" pitchFamily="34" charset="0"/>
+              <a:buChar char="•"/>
+            </a:pPr>
+            <a:r>
+              <a:rPr lang="en-US" sz="3200" dirty="0"/>
+              <a:t>Channel specific</a:t>
+            </a:r>
+          </a:p>
+        </p:txBody>
+      </p:sp>
       <p:cxnSp>
         <p:nvCxnSpPr>
-          <p:cNvPr id="10" name="Straight Connector 9">
+          <p:cNvPr id="8" name="Straight Connector 7">
             <a:extLst>
               <a:ext uri="{FF2B5EF4-FFF2-40B4-BE49-F238E27FC236}">
-                <a16:creationId xmlns:a16="http://schemas.microsoft.com/office/drawing/2014/main" id="{E27EE9E3-0DA6-7D46-9D6B-C8A5EBC26462}"/>
+                <a16:creationId xmlns:a16="http://schemas.microsoft.com/office/drawing/2014/main" id="{D1BF3DB6-135B-1F46-A1B4-9C7CB077E1AA}"/>
               </a:ext>
             </a:extLst>
           </p:cNvPr>
@@ -7360,10 +7029,10 @@
       </p:cxnSp>
       <p:cxnSp>
         <p:nvCxnSpPr>
-          <p:cNvPr id="11" name="Straight Connector 10">
+          <p:cNvPr id="9" name="Straight Connector 8">
             <a:extLst>
               <a:ext uri="{FF2B5EF4-FFF2-40B4-BE49-F238E27FC236}">
-                <a16:creationId xmlns:a16="http://schemas.microsoft.com/office/drawing/2014/main" id="{041BA0E9-D4C1-2B41-9C2A-AF768E5CB01D}"/>
+                <a16:creationId xmlns:a16="http://schemas.microsoft.com/office/drawing/2014/main" id="{F1A18A42-EF63-3C4E-8107-2BF59ABC9148}"/>
               </a:ext>
             </a:extLst>
           </p:cNvPr>
@@ -7401,110 +7070,10 @@
           </a:fontRef>
         </p:style>
       </p:cxnSp>
-      <p:sp>
-        <p:nvSpPr>
-          <p:cNvPr id="5" name="TextBox 4">
-            <a:extLst>
-              <a:ext uri="{FF2B5EF4-FFF2-40B4-BE49-F238E27FC236}">
-                <a16:creationId xmlns:a16="http://schemas.microsoft.com/office/drawing/2014/main" id="{FCFF571F-07A2-F544-B376-7CE08D7387A8}"/>
-              </a:ext>
-            </a:extLst>
-          </p:cNvPr>
-          <p:cNvSpPr txBox="1"/>
-          <p:nvPr/>
-        </p:nvSpPr>
-        <p:spPr>
-          <a:xfrm>
-            <a:off x="296884" y="1603169"/>
-            <a:ext cx="1839799" cy="369332"/>
-          </a:xfrm>
-          <a:prstGeom prst="rect">
-            <a:avLst/>
-          </a:prstGeom>
-          <a:noFill/>
-        </p:spPr>
-        <p:txBody>
-          <a:bodyPr wrap="none" rtlCol="0">
-            <a:spAutoFit/>
-          </a:bodyPr>
-          <a:lstStyle/>
-          <a:p>
-            <a:r>
-              <a:rPr lang="en-US" dirty="0" err="1"/>
-              <a:t>B_more_strings.R</a:t>
-            </a:r>
-            <a:endParaRPr lang="en-US" dirty="0"/>
-          </a:p>
-        </p:txBody>
-      </p:sp>
-      <p:pic>
-        <p:nvPicPr>
-          <p:cNvPr id="6" name="Picture 5">
-            <a:extLst>
-              <a:ext uri="{FF2B5EF4-FFF2-40B4-BE49-F238E27FC236}">
-                <a16:creationId xmlns:a16="http://schemas.microsoft.com/office/drawing/2014/main" id="{E69103CE-72B5-3248-B704-E3AD01645FF2}"/>
-              </a:ext>
-            </a:extLst>
-          </p:cNvPr>
-          <p:cNvPicPr>
-            <a:picLocks noChangeAspect="1"/>
-          </p:cNvPicPr>
-          <p:nvPr/>
-        </p:nvPicPr>
-        <p:blipFill>
-          <a:blip r:embed="rId2"/>
-          <a:stretch>
-            <a:fillRect/>
-          </a:stretch>
-        </p:blipFill>
-        <p:spPr>
-          <a:xfrm>
-            <a:off x="862149" y="2635249"/>
-            <a:ext cx="4979851" cy="3112407"/>
-          </a:xfrm>
-          <a:prstGeom prst="rect">
-            <a:avLst/>
-          </a:prstGeom>
-        </p:spPr>
-      </p:pic>
-      <p:sp>
-        <p:nvSpPr>
-          <p:cNvPr id="12" name="Footer Placeholder 4">
-            <a:extLst>
-              <a:ext uri="{FF2B5EF4-FFF2-40B4-BE49-F238E27FC236}">
-                <a16:creationId xmlns:a16="http://schemas.microsoft.com/office/drawing/2014/main" id="{0800008A-AEB6-1C48-ABED-B835A2564E4F}"/>
-              </a:ext>
-            </a:extLst>
-          </p:cNvPr>
-          <p:cNvSpPr>
-            <a:spLocks noGrp="1"/>
-          </p:cNvSpPr>
-          <p:nvPr>
-            <p:ph type="ftr" sz="quarter" idx="3"/>
-          </p:nvPr>
-        </p:nvSpPr>
-        <p:spPr>
-          <a:xfrm>
-            <a:off x="3028950" y="6356351"/>
-            <a:ext cx="3086100" cy="365125"/>
-          </a:xfrm>
-        </p:spPr>
-        <p:txBody>
-          <a:bodyPr/>
-          <a:lstStyle/>
-          <a:p>
-            <a:r>
-              <a:rPr lang="en-US"/>
-              <a:t>Kwartler</a:t>
-            </a:r>
-            <a:endParaRPr lang="en-US" dirty="0"/>
-          </a:p>
-        </p:txBody>
-      </p:sp>
     </p:spTree>
     <p:extLst>
       <p:ext uri="{BB962C8B-B14F-4D97-AF65-F5344CB8AC3E}">
-        <p14:creationId xmlns:p14="http://schemas.microsoft.com/office/powerpoint/2010/main" val="736318942"/>
+        <p14:creationId xmlns:p14="http://schemas.microsoft.com/office/powerpoint/2010/main" val="3783272020"/>
       </p:ext>
     </p:extLst>
   </p:cSld>
@@ -7548,7 +7117,7 @@
           <a:p>
             <a:fld id="{6700A58B-DD98-43D0-B791-721480A02982}" type="datetime1">
               <a:rPr lang="en-US" smtClean="0"/>
-              <a:t>1/10/21</a:t>
+              <a:t>1/23/21</a:t>
             </a:fld>
             <a:endParaRPr lang="en-US"/>
           </a:p>
@@ -7571,7 +7140,7 @@
           <a:p>
             <a:r>
               <a:rPr lang="en-US" dirty="0"/>
-              <a:t>What about misspelling?</a:t>
+              <a:t>R packages to deal with misspelling</a:t>
             </a:r>
           </a:p>
         </p:txBody>
@@ -7622,47 +7191,6 @@
           </a:p>
         </p:txBody>
       </p:sp>
-      <p:pic>
-        <p:nvPicPr>
-          <p:cNvPr id="2050" name="Picture 2" descr="Image result for misspelling meme"/>
-          <p:cNvPicPr>
-            <a:picLocks noChangeAspect="1" noChangeArrowheads="1"/>
-          </p:cNvPicPr>
-          <p:nvPr/>
-        </p:nvPicPr>
-        <p:blipFill>
-          <a:blip r:embed="rId2">
-            <a:extLst>
-              <a:ext uri="{28A0092B-C50C-407E-A947-70E740481C1C}">
-                <a14:useLocalDpi xmlns:a14="http://schemas.microsoft.com/office/drawing/2010/main" val="0"/>
-              </a:ext>
-            </a:extLst>
-          </a:blip>
-          <a:srcRect/>
-          <a:stretch>
-            <a:fillRect/>
-          </a:stretch>
-        </p:blipFill>
-        <p:spPr bwMode="auto">
-          <a:xfrm>
-            <a:off x="313231" y="1261241"/>
-            <a:ext cx="3570500" cy="4477407"/>
-          </a:xfrm>
-          <a:prstGeom prst="rect">
-            <a:avLst/>
-          </a:prstGeom>
-          <a:noFill/>
-          <a:extLst>
-            <a:ext uri="{909E8E84-426E-40DD-AFC4-6F175D3DCCD1}">
-              <a14:hiddenFill xmlns:a14="http://schemas.microsoft.com/office/drawing/2010/main">
-                <a:solidFill>
-                  <a:srgbClr val="FFFFFF"/>
-                </a:solidFill>
-              </a14:hiddenFill>
-            </a:ext>
-          </a:extLst>
-        </p:spPr>
-      </p:pic>
       <p:sp>
         <p:nvSpPr>
           <p:cNvPr id="6" name="TextBox 5"/>
@@ -7671,8 +7199,8 @@
         </p:nvSpPr>
         <p:spPr>
           <a:xfrm>
-            <a:off x="4776952" y="2522483"/>
-            <a:ext cx="3334503" cy="1569660"/>
+            <a:off x="362606" y="1371601"/>
+            <a:ext cx="4145687" cy="923330"/>
           </a:xfrm>
           <a:prstGeom prst="rect">
             <a:avLst/>
@@ -7684,14 +7212,47 @@
             <a:spAutoFit/>
           </a:bodyPr>
           <a:lstStyle/>
+          <a:p>
+            <a:r>
+              <a:rPr lang="en-US" dirty="0">
+                <a:latin typeface="Consolas" panose="020B0609020204030204" pitchFamily="49" charset="0"/>
+                <a:cs typeface="Consolas" panose="020B0609020204030204" pitchFamily="49" charset="0"/>
+              </a:rPr>
+              <a:t>library(</a:t>
+            </a:r>
+            <a:r>
+              <a:rPr lang="en-US" dirty="0" err="1">
+                <a:latin typeface="Consolas" panose="020B0609020204030204" pitchFamily="49" charset="0"/>
+                <a:cs typeface="Consolas" panose="020B0609020204030204" pitchFamily="49" charset="0"/>
+              </a:rPr>
+              <a:t>qdap</a:t>
+            </a:r>
+            <a:r>
+              <a:rPr lang="en-US" dirty="0">
+                <a:latin typeface="Consolas" panose="020B0609020204030204" pitchFamily="49" charset="0"/>
+                <a:cs typeface="Consolas" panose="020B0609020204030204" pitchFamily="49" charset="0"/>
+              </a:rPr>
+              <a:t>)</a:t>
+            </a:r>
+          </a:p>
           <a:p>
             <a:pPr marL="285750" indent="-285750">
               <a:buFont typeface="Arial" panose="020B0604020202020204" pitchFamily="34" charset="0"/>
               <a:buChar char="•"/>
             </a:pPr>
             <a:r>
-              <a:rPr lang="en-US" sz="3200" dirty="0"/>
-              <a:t>Prevalent</a:t>
+              <a:rPr lang="en-US" dirty="0" err="1">
+                <a:latin typeface="Consolas" panose="020B0609020204030204" pitchFamily="49" charset="0"/>
+                <a:cs typeface="Consolas" panose="020B0609020204030204" pitchFamily="49" charset="0"/>
+              </a:rPr>
+              <a:t>check_spelling</a:t>
+            </a:r>
+            <a:r>
+              <a:rPr lang="en-US" dirty="0">
+                <a:latin typeface="Consolas" panose="020B0609020204030204" pitchFamily="49" charset="0"/>
+                <a:cs typeface="Consolas" panose="020B0609020204030204" pitchFamily="49" charset="0"/>
+              </a:rPr>
+              <a:t>(…)</a:t>
             </a:r>
           </a:p>
           <a:p>
@@ -7700,28 +7261,137 @@
               <a:buChar char="•"/>
             </a:pPr>
             <a:r>
-              <a:rPr lang="en-US" sz="3200" dirty="0"/>
-              <a:t>Painful to correct</a:t>
-            </a:r>
-          </a:p>
-          <a:p>
-            <a:pPr marL="285750" indent="-285750">
-              <a:buFont typeface="Arial" panose="020B0604020202020204" pitchFamily="34" charset="0"/>
-              <a:buChar char="•"/>
+              <a:rPr lang="en-US" dirty="0" err="1">
+                <a:latin typeface="Consolas" panose="020B0609020204030204" pitchFamily="49" charset="0"/>
+                <a:cs typeface="Consolas" panose="020B0609020204030204" pitchFamily="49" charset="0"/>
+              </a:rPr>
+              <a:t>check_spelling_interactive</a:t>
+            </a:r>
+            <a:r>
+              <a:rPr lang="en-US" dirty="0">
+                <a:latin typeface="Consolas" panose="020B0609020204030204" pitchFamily="49" charset="0"/>
+                <a:cs typeface="Consolas" panose="020B0609020204030204" pitchFamily="49" charset="0"/>
+              </a:rPr>
+              <a:t>(…)</a:t>
+            </a:r>
+          </a:p>
+        </p:txBody>
+      </p:sp>
+      <p:sp>
+        <p:nvSpPr>
+          <p:cNvPr id="7" name="TextBox 6"/>
+          <p:cNvSpPr txBox="1"/>
+          <p:nvPr/>
+        </p:nvSpPr>
+        <p:spPr>
+          <a:xfrm rot="19512593">
+            <a:off x="4855780" y="2002221"/>
+            <a:ext cx="2320572" cy="369332"/>
+          </a:xfrm>
+          <a:prstGeom prst="rect">
+            <a:avLst/>
+          </a:prstGeom>
+          <a:solidFill>
+            <a:srgbClr val="FFC000"/>
+          </a:solidFill>
+        </p:spPr>
+        <p:txBody>
+          <a:bodyPr wrap="none" rtlCol="0">
+            <a:spAutoFit/>
+          </a:bodyPr>
+          <a:lstStyle/>
+          <a:p>
+            <a:r>
+              <a:rPr lang="en-US" dirty="0"/>
+              <a:t>Crashes </a:t>
+            </a:r>
+            <a:r>
+              <a:rPr lang="en-US" dirty="0" err="1"/>
+              <a:t>Rstudio.cloud</a:t>
+            </a:r>
+            <a:r>
+              <a:rPr lang="en-US" dirty="0"/>
+              <a:t>!</a:t>
+            </a:r>
+          </a:p>
+        </p:txBody>
+      </p:sp>
+      <p:sp>
+        <p:nvSpPr>
+          <p:cNvPr id="9" name="TextBox 8"/>
+          <p:cNvSpPr txBox="1"/>
+          <p:nvPr/>
+        </p:nvSpPr>
+        <p:spPr>
+          <a:xfrm>
+            <a:off x="236484" y="3499945"/>
+            <a:ext cx="6769434" cy="2862322"/>
+          </a:xfrm>
+          <a:prstGeom prst="rect">
+            <a:avLst/>
+          </a:prstGeom>
+          <a:noFill/>
+        </p:spPr>
+        <p:txBody>
+          <a:bodyPr wrap="square" rtlCol="0">
+            <a:spAutoFit/>
+          </a:bodyPr>
+          <a:lstStyle/>
+          <a:p>
+            <a:pPr marL="342900" indent="-342900">
+              <a:buFont typeface="+mj-lt"/>
+              <a:buAutoNum type="arabicPeriod"/>
             </a:pPr>
             <a:r>
-              <a:rPr lang="en-US" sz="3200" dirty="0"/>
-              <a:t>Channel specific</a:t>
-            </a:r>
+              <a:rPr lang="en-US" dirty="0"/>
+              <a:t>Separate the words from a string into individual terms.</a:t>
+            </a:r>
+          </a:p>
+          <a:p>
+            <a:pPr marL="342900" indent="-342900">
+              <a:buFont typeface="+mj-lt"/>
+              <a:buAutoNum type="arabicPeriod"/>
+            </a:pPr>
+            <a:endParaRPr lang="en-US" dirty="0"/>
+          </a:p>
+          <a:p>
+            <a:pPr marL="342900" indent="-342900">
+              <a:buFont typeface="+mj-lt"/>
+              <a:buAutoNum type="arabicPeriod"/>
+            </a:pPr>
+            <a:r>
+              <a:rPr lang="en-US" dirty="0"/>
+              <a:t>Look those words up in a dictionary to find words not recognized/found (considered possibly misspelled).</a:t>
+            </a:r>
+          </a:p>
+          <a:p>
+            <a:pPr marL="342900" indent="-342900">
+              <a:buFont typeface="+mj-lt"/>
+              <a:buAutoNum type="arabicPeriod"/>
+            </a:pPr>
+            <a:endParaRPr lang="en-US" dirty="0"/>
+          </a:p>
+          <a:p>
+            <a:pPr marL="342900" indent="-342900">
+              <a:buFont typeface="+mj-lt"/>
+              <a:buAutoNum type="arabicPeriod"/>
+            </a:pPr>
+            <a:r>
+              <a:rPr lang="en-US" dirty="0"/>
+              <a:t>These misses (possible misspellings) will be what is looked up for suggested replacements and top “n” terms returns. It uses “string distance” the number of characters needed to change the unknown into the known word in the dictionary.</a:t>
+            </a:r>
+          </a:p>
+          <a:p>
+            <a:endParaRPr lang="en-US" dirty="0"/>
           </a:p>
         </p:txBody>
       </p:sp>
       <p:cxnSp>
         <p:nvCxnSpPr>
-          <p:cNvPr id="8" name="Straight Connector 7">
+          <p:cNvPr id="10" name="Straight Connector 9">
             <a:extLst>
               <a:ext uri="{FF2B5EF4-FFF2-40B4-BE49-F238E27FC236}">
-                <a16:creationId xmlns:a16="http://schemas.microsoft.com/office/drawing/2014/main" id="{D1BF3DB6-135B-1F46-A1B4-9C7CB077E1AA}"/>
+                <a16:creationId xmlns:a16="http://schemas.microsoft.com/office/drawing/2014/main" id="{596EA9A9-9099-D14B-8ECE-AD7A1CA74642}"/>
               </a:ext>
             </a:extLst>
           </p:cNvPr>
@@ -7761,10 +7431,10 @@
       </p:cxnSp>
       <p:cxnSp>
         <p:nvCxnSpPr>
-          <p:cNvPr id="9" name="Straight Connector 8">
+          <p:cNvPr id="11" name="Straight Connector 10">
             <a:extLst>
               <a:ext uri="{FF2B5EF4-FFF2-40B4-BE49-F238E27FC236}">
-                <a16:creationId xmlns:a16="http://schemas.microsoft.com/office/drawing/2014/main" id="{F1A18A42-EF63-3C4E-8107-2BF59ABC9148}"/>
+                <a16:creationId xmlns:a16="http://schemas.microsoft.com/office/drawing/2014/main" id="{4C84C0C8-65B2-5E46-A2B6-B82A941EFADA}"/>
               </a:ext>
             </a:extLst>
           </p:cNvPr>
@@ -7805,7 +7475,7 @@
     </p:spTree>
     <p:extLst>
       <p:ext uri="{BB962C8B-B14F-4D97-AF65-F5344CB8AC3E}">
-        <p14:creationId xmlns:p14="http://schemas.microsoft.com/office/powerpoint/2010/main" val="3783272020"/>
+        <p14:creationId xmlns:p14="http://schemas.microsoft.com/office/powerpoint/2010/main" val="1257319039"/>
       </p:ext>
     </p:extLst>
   </p:cSld>
@@ -7849,7 +7519,7 @@
           <a:p>
             <a:fld id="{6700A58B-DD98-43D0-B791-721480A02982}" type="datetime1">
               <a:rPr lang="en-US" smtClean="0"/>
-              <a:t>1/10/21</a:t>
+              <a:t>1/23/21</a:t>
             </a:fld>
             <a:endParaRPr lang="en-US"/>
           </a:p>
@@ -7932,7 +7602,7 @@
         <p:spPr>
           <a:xfrm>
             <a:off x="362606" y="1371601"/>
-            <a:ext cx="4145687" cy="923330"/>
+            <a:ext cx="5883342" cy="1200329"/>
           </a:xfrm>
           <a:prstGeom prst="rect">
             <a:avLst/>
@@ -7957,14 +7627,14 @@
                 <a:latin typeface="Consolas" panose="020B0609020204030204" pitchFamily="49" charset="0"/>
                 <a:cs typeface="Consolas" panose="020B0609020204030204" pitchFamily="49" charset="0"/>
               </a:rPr>
-              <a:t>qdap</a:t>
+              <a:t>hunspell</a:t>
             </a:r>
             <a:r>
               <a:rPr lang="en-US" dirty="0">
                 <a:latin typeface="Consolas" panose="020B0609020204030204" pitchFamily="49" charset="0"/>
                 <a:cs typeface="Consolas" panose="020B0609020204030204" pitchFamily="49" charset="0"/>
               </a:rPr>
-              <a:t>)</a:t>
+              <a:t>) #https://hunspell.github.io</a:t>
             </a:r>
           </a:p>
           <a:p>
@@ -7977,7 +7647,7 @@
                 <a:latin typeface="Consolas" panose="020B0609020204030204" pitchFamily="49" charset="0"/>
                 <a:cs typeface="Consolas" panose="020B0609020204030204" pitchFamily="49" charset="0"/>
               </a:rPr>
-              <a:t>check_spelling</a:t>
+              <a:t>hunspell_check</a:t>
             </a:r>
             <a:r>
               <a:rPr lang="en-US" dirty="0">
@@ -7997,7 +7667,7 @@
                 <a:latin typeface="Consolas" panose="020B0609020204030204" pitchFamily="49" charset="0"/>
                 <a:cs typeface="Consolas" panose="020B0609020204030204" pitchFamily="49" charset="0"/>
               </a:rPr>
-              <a:t>check_spelling_interactive</a:t>
+              <a:t>hunspell_suggest</a:t>
             </a:r>
             <a:r>
               <a:rPr lang="en-US" dirty="0">
@@ -8007,6 +7677,26 @@
               <a:t>(…)</a:t>
             </a:r>
           </a:p>
+          <a:p>
+            <a:pPr marL="285750" indent="-285750">
+              <a:buFont typeface="Arial" panose="020B0604020202020204" pitchFamily="34" charset="0"/>
+              <a:buChar char="•"/>
+            </a:pPr>
+            <a:r>
+              <a:rPr lang="en-US" dirty="0" err="1">
+                <a:latin typeface="Consolas" panose="020B0609020204030204" pitchFamily="49" charset="0"/>
+                <a:cs typeface="Consolas" panose="020B0609020204030204" pitchFamily="49" charset="0"/>
+              </a:rPr>
+              <a:t>hunspell_analyze</a:t>
+            </a:r>
+            <a:r>
+              <a:rPr lang="en-US" dirty="0">
+                <a:latin typeface="Consolas" panose="020B0609020204030204" pitchFamily="49" charset="0"/>
+                <a:cs typeface="Consolas" panose="020B0609020204030204" pitchFamily="49" charset="0"/>
+              </a:rPr>
+              <a:t>(…)</a:t>
+            </a:r>
+          </a:p>
         </p:txBody>
       </p:sp>
       <p:sp>
@@ -8017,8 +7707,8 @@
         </p:nvSpPr>
         <p:spPr>
           <a:xfrm rot="19512593">
-            <a:off x="4855780" y="2002221"/>
-            <a:ext cx="2320572" cy="369332"/>
+            <a:off x="6471151" y="1923393"/>
+            <a:ext cx="1517723" cy="369332"/>
           </a:xfrm>
           <a:prstGeom prst="rect">
             <a:avLst/>
@@ -8035,29 +7725,21 @@
           <a:p>
             <a:r>
               <a:rPr lang="en-US" dirty="0"/>
-              <a:t>Crashes </a:t>
-            </a:r>
-            <a:r>
-              <a:rPr lang="en-US" dirty="0" err="1"/>
-              <a:t>Rstudio.cloud</a:t>
-            </a:r>
-            <a:r>
-              <a:rPr lang="en-US" dirty="0"/>
-              <a:t>!</a:t>
-            </a:r>
-          </a:p>
-        </p:txBody>
-      </p:sp>
-      <p:sp>
-        <p:nvSpPr>
-          <p:cNvPr id="9" name="TextBox 8"/>
+              <a:t>Clunky to use!</a:t>
+            </a:r>
+          </a:p>
+        </p:txBody>
+      </p:sp>
+      <p:sp>
+        <p:nvSpPr>
+          <p:cNvPr id="11" name="TextBox 10"/>
           <p:cNvSpPr txBox="1"/>
           <p:nvPr/>
         </p:nvSpPr>
         <p:spPr>
           <a:xfrm>
             <a:off x="236484" y="3499945"/>
-            <a:ext cx="6769434" cy="2862322"/>
+            <a:ext cx="8623738" cy="1754326"/>
           </a:xfrm>
           <a:prstGeom prst="rect">
             <a:avLst/>
@@ -8076,7 +7758,23 @@
             </a:pPr>
             <a:r>
               <a:rPr lang="en-US" dirty="0"/>
-              <a:t>Separate the words from a string into individual terms.</a:t>
+              <a:t>Check the terms (doesn’t always catch the terms as well as </a:t>
+            </a:r>
+            <a:r>
+              <a:rPr lang="en-US" dirty="0" err="1"/>
+              <a:t>qdap</a:t>
+            </a:r>
+            <a:r>
+              <a:rPr lang="en-US" dirty="0"/>
+              <a:t> in my </a:t>
+            </a:r>
+            <a:r>
+              <a:rPr lang="en-US" dirty="0" err="1"/>
+              <a:t>exp</a:t>
+            </a:r>
+            <a:r>
+              <a:rPr lang="en-US" dirty="0"/>
+              <a:t>)</a:t>
             </a:r>
           </a:p>
           <a:p>
@@ -8093,7 +7791,7 @@
             </a:pPr>
             <a:r>
               <a:rPr lang="en-US" dirty="0"/>
-              <a:t>Look those words up in a dictionary to find words not recognized/found (considered possibly misspelled).</a:t>
+              <a:t>Identify the suggestions</a:t>
             </a:r>
           </a:p>
           <a:p>
@@ -8110,11 +7808,74 @@
             </a:pPr>
             <a:r>
               <a:rPr lang="en-US" dirty="0"/>
-              <a:t>These misses (possible misspellings) will be what is looked up for suggested replacements and top “n” terms returns. It uses “string distance” the number of characters needed to change the unknown into the known word in the dictionary.</a:t>
+              <a:t>No way to get suggestions easily corrected and inserted!</a:t>
             </a:r>
           </a:p>
           <a:p>
             <a:endParaRPr lang="en-US" dirty="0"/>
+          </a:p>
+        </p:txBody>
+      </p:sp>
+      <p:sp>
+        <p:nvSpPr>
+          <p:cNvPr id="12" name="Rectangle 11">
+            <a:extLst>
+              <a:ext uri="{FF2B5EF4-FFF2-40B4-BE49-F238E27FC236}">
+                <a16:creationId xmlns:a16="http://schemas.microsoft.com/office/drawing/2014/main" id="{CE6549BB-6AF5-468A-8D72-A45EED7452EF}"/>
+              </a:ext>
+            </a:extLst>
+          </p:cNvPr>
+          <p:cNvSpPr/>
+          <p:nvPr/>
+        </p:nvSpPr>
+        <p:spPr>
+          <a:xfrm>
+            <a:off x="228600" y="5313693"/>
+            <a:ext cx="8686800" cy="706581"/>
+          </a:xfrm>
+          <a:prstGeom prst="rect">
+            <a:avLst/>
+          </a:prstGeom>
+          <a:solidFill>
+            <a:schemeClr val="accent6"/>
+          </a:solidFill>
+          <a:ln>
+            <a:noFill/>
+          </a:ln>
+        </p:spPr>
+        <p:style>
+          <a:lnRef idx="2">
+            <a:schemeClr val="accent1">
+              <a:shade val="50000"/>
+            </a:schemeClr>
+          </a:lnRef>
+          <a:fillRef idx="1">
+            <a:schemeClr val="accent1"/>
+          </a:fillRef>
+          <a:effectRef idx="0">
+            <a:schemeClr val="accent1"/>
+          </a:effectRef>
+          <a:fontRef idx="minor">
+            <a:schemeClr val="lt1"/>
+          </a:fontRef>
+        </p:style>
+        <p:txBody>
+          <a:bodyPr rot="0" spcFirstLastPara="0" vertOverflow="overflow" horzOverflow="overflow" vert="horz" wrap="square" lIns="91440" tIns="45720" rIns="91440" bIns="45720" numCol="1" spcCol="0" rtlCol="0" fromWordArt="0" anchor="ctr" anchorCtr="0" forceAA="0" compatLnSpc="1">
+            <a:prstTxWarp prst="textNoShape">
+              <a:avLst/>
+            </a:prstTxWarp>
+            <a:noAutofit/>
+          </a:bodyPr>
+          <a:lstStyle/>
+          <a:p>
+            <a:r>
+              <a:rPr lang="en-US" dirty="0">
+                <a:solidFill>
+                  <a:schemeClr val="bg1"/>
+                </a:solidFill>
+              </a:rPr>
+              <a:t>Same spelling engine used for Chrome/Firefox etc.</a:t>
+            </a:r>
           </a:p>
         </p:txBody>
       </p:sp>
@@ -8123,7 +7884,7 @@
           <p:cNvPr id="10" name="Straight Connector 9">
             <a:extLst>
               <a:ext uri="{FF2B5EF4-FFF2-40B4-BE49-F238E27FC236}">
-                <a16:creationId xmlns:a16="http://schemas.microsoft.com/office/drawing/2014/main" id="{596EA9A9-9099-D14B-8ECE-AD7A1CA74642}"/>
+                <a16:creationId xmlns:a16="http://schemas.microsoft.com/office/drawing/2014/main" id="{174C34CD-B5FB-1445-9557-03515CA0D2D6}"/>
               </a:ext>
             </a:extLst>
           </p:cNvPr>
@@ -8163,10 +7924,10 @@
       </p:cxnSp>
       <p:cxnSp>
         <p:nvCxnSpPr>
-          <p:cNvPr id="11" name="Straight Connector 10">
+          <p:cNvPr id="13" name="Straight Connector 12">
             <a:extLst>
               <a:ext uri="{FF2B5EF4-FFF2-40B4-BE49-F238E27FC236}">
-                <a16:creationId xmlns:a16="http://schemas.microsoft.com/office/drawing/2014/main" id="{4C84C0C8-65B2-5E46-A2B6-B82A941EFADA}"/>
+                <a16:creationId xmlns:a16="http://schemas.microsoft.com/office/drawing/2014/main" id="{FE4CF92F-1761-7C44-9238-07CC444AB680}"/>
               </a:ext>
             </a:extLst>
           </p:cNvPr>
@@ -8207,7 +7968,7 @@
     </p:spTree>
     <p:extLst>
       <p:ext uri="{BB962C8B-B14F-4D97-AF65-F5344CB8AC3E}">
-        <p14:creationId xmlns:p14="http://schemas.microsoft.com/office/powerpoint/2010/main" val="1257319039"/>
+        <p14:creationId xmlns:p14="http://schemas.microsoft.com/office/powerpoint/2010/main" val="3086038105"/>
       </p:ext>
     </p:extLst>
   </p:cSld>
@@ -8251,7 +8012,7 @@
           <a:p>
             <a:fld id="{6700A58B-DD98-43D0-B791-721480A02982}" type="datetime1">
               <a:rPr lang="en-US" smtClean="0"/>
-              <a:t>1/10/21</a:t>
+              <a:t>1/23/21</a:t>
             </a:fld>
             <a:endParaRPr lang="en-US"/>
           </a:p>
@@ -8334,7 +8095,7 @@
         <p:spPr>
           <a:xfrm>
             <a:off x="362606" y="1371601"/>
-            <a:ext cx="5883342" cy="1200329"/>
+            <a:ext cx="2879314" cy="1200329"/>
           </a:xfrm>
           <a:prstGeom prst="rect">
             <a:avLst/>
@@ -8352,21 +8113,7 @@
                 <a:latin typeface="Consolas" panose="020B0609020204030204" pitchFamily="49" charset="0"/>
                 <a:cs typeface="Consolas" panose="020B0609020204030204" pitchFamily="49" charset="0"/>
               </a:rPr>
-              <a:t>library(</a:t>
-            </a:r>
-            <a:r>
-              <a:rPr lang="en-US" dirty="0" err="1">
-                <a:latin typeface="Consolas" panose="020B0609020204030204" pitchFamily="49" charset="0"/>
-                <a:cs typeface="Consolas" panose="020B0609020204030204" pitchFamily="49" charset="0"/>
-              </a:rPr>
-              <a:t>hunspell</a:t>
-            </a:r>
-            <a:r>
-              <a:rPr lang="en-US" dirty="0">
-                <a:latin typeface="Consolas" panose="020B0609020204030204" pitchFamily="49" charset="0"/>
-                <a:cs typeface="Consolas" panose="020B0609020204030204" pitchFamily="49" charset="0"/>
-              </a:rPr>
-              <a:t>) #https://hunspell.github.io</a:t>
+              <a:t>Library(spelling) </a:t>
             </a:r>
           </a:p>
           <a:p>
@@ -8439,8 +8186,8 @@
         </p:nvSpPr>
         <p:spPr>
           <a:xfrm rot="19512593">
-            <a:off x="6471151" y="1923393"/>
-            <a:ext cx="1517723" cy="369332"/>
+            <a:off x="5125326" y="1792441"/>
+            <a:ext cx="2753280" cy="923330"/>
           </a:xfrm>
           <a:prstGeom prst="rect">
             <a:avLst/>
@@ -8450,14 +8197,30 @@
           </a:solidFill>
         </p:spPr>
         <p:txBody>
-          <a:bodyPr wrap="none" rtlCol="0">
+          <a:bodyPr wrap="square" rtlCol="0">
             <a:spAutoFit/>
           </a:bodyPr>
           <a:lstStyle/>
           <a:p>
             <a:r>
               <a:rPr lang="en-US" dirty="0"/>
-              <a:t>Clunky to use!</a:t>
+              <a:t>We will use in this course but </a:t>
+            </a:r>
+            <a:r>
+              <a:rPr lang="en-US" dirty="0" err="1"/>
+              <a:t>pg</a:t>
+            </a:r>
+            <a:r>
+              <a:rPr lang="en-US" dirty="0"/>
+              <a:t> 45 of the book has the </a:t>
+            </a:r>
+            <a:r>
+              <a:rPr lang="en-US" dirty="0" err="1"/>
+              <a:t>qdap</a:t>
+            </a:r>
+            <a:r>
+              <a:rPr lang="en-US" dirty="0"/>
+              <a:t> option</a:t>
             </a:r>
           </a:p>
         </p:txBody>
@@ -8470,8 +8233,8 @@
         </p:nvSpPr>
         <p:spPr>
           <a:xfrm>
-            <a:off x="236484" y="3499945"/>
-            <a:ext cx="8623738" cy="1754326"/>
+            <a:off x="268015" y="3121573"/>
+            <a:ext cx="8623738" cy="2031325"/>
           </a:xfrm>
           <a:prstGeom prst="rect">
             <a:avLst/>
@@ -8490,23 +8253,7 @@
             </a:pPr>
             <a:r>
               <a:rPr lang="en-US" dirty="0"/>
-              <a:t>Check the terms (doesn’t always catch the terms as well as </a:t>
-            </a:r>
-            <a:r>
-              <a:rPr lang="en-US" dirty="0" err="1"/>
-              <a:t>qdap</a:t>
-            </a:r>
-            <a:r>
-              <a:rPr lang="en-US" dirty="0"/>
-              <a:t> in my </a:t>
-            </a:r>
-            <a:r>
-              <a:rPr lang="en-US" dirty="0" err="1"/>
-              <a:t>exp</a:t>
-            </a:r>
-            <a:r>
-              <a:rPr lang="en-US" dirty="0"/>
-              <a:t>)</a:t>
+              <a:t>Check the terms</a:t>
             </a:r>
           </a:p>
           <a:p>
@@ -8540,11 +8287,33 @@
             </a:pPr>
             <a:r>
               <a:rPr lang="en-US" dirty="0"/>
-              <a:t>No way to get suggestions easily corrected and inserted!</a:t>
-            </a:r>
-          </a:p>
-          <a:p>
+              <a:t>Organize the suggestions into a lexicon </a:t>
+            </a:r>
+          </a:p>
+          <a:p>
+            <a:pPr marL="342900" indent="-342900">
+              <a:buFont typeface="+mj-lt"/>
+              <a:buAutoNum type="arabicPeriod"/>
+            </a:pPr>
             <a:endParaRPr lang="en-US" dirty="0"/>
+          </a:p>
+          <a:p>
+            <a:pPr marL="342900" indent="-342900">
+              <a:buFont typeface="+mj-lt"/>
+              <a:buAutoNum type="arabicPeriod"/>
+            </a:pPr>
+            <a:r>
+              <a:rPr lang="en-US" dirty="0"/>
+              <a:t>Use a global substitution (</a:t>
+            </a:r>
+            <a:r>
+              <a:rPr lang="en-US" dirty="0" err="1"/>
+              <a:t>gsub</a:t>
+            </a:r>
+            <a:r>
+              <a:rPr lang="en-US" dirty="0"/>
+              <a:t>) to correct identified misspellings</a:t>
+            </a:r>
           </a:p>
         </p:txBody>
       </p:sp>
@@ -8562,8 +8331,8 @@
         </p:nvSpPr>
         <p:spPr>
           <a:xfrm>
-            <a:off x="228600" y="5313693"/>
-            <a:ext cx="8686800" cy="706581"/>
+            <a:off x="228600" y="5455587"/>
+            <a:ext cx="8686800" cy="472252"/>
           </a:xfrm>
           <a:prstGeom prst="rect">
             <a:avLst/>
@@ -8606,7 +8375,23 @@
                   <a:schemeClr val="bg1"/>
                 </a:solidFill>
               </a:rPr>
-              <a:t>Same spelling engine used for Chrome/Firefox etc.</a:t>
+              <a:t>Still uses the benefit of </a:t>
+            </a:r>
+            <a:r>
+              <a:rPr lang="en-US" dirty="0" err="1">
+                <a:solidFill>
+                  <a:schemeClr val="bg1"/>
+                </a:solidFill>
+              </a:rPr>
+              <a:t>hunspell</a:t>
+            </a:r>
+            <a:r>
+              <a:rPr lang="en-US" dirty="0">
+                <a:solidFill>
+                  <a:schemeClr val="bg1"/>
+                </a:solidFill>
+              </a:rPr>
+              <a:t> but is easier to interact with.  </a:t>
             </a:r>
           </a:p>
         </p:txBody>
@@ -8616,7 +8401,7 @@
           <p:cNvPr id="10" name="Straight Connector 9">
             <a:extLst>
               <a:ext uri="{FF2B5EF4-FFF2-40B4-BE49-F238E27FC236}">
-                <a16:creationId xmlns:a16="http://schemas.microsoft.com/office/drawing/2014/main" id="{174C34CD-B5FB-1445-9557-03515CA0D2D6}"/>
+                <a16:creationId xmlns:a16="http://schemas.microsoft.com/office/drawing/2014/main" id="{1E1D199A-FC2C-014D-961F-D31B0E03CD83}"/>
               </a:ext>
             </a:extLst>
           </p:cNvPr>
@@ -8659,7 +8444,7 @@
           <p:cNvPr id="13" name="Straight Connector 12">
             <a:extLst>
               <a:ext uri="{FF2B5EF4-FFF2-40B4-BE49-F238E27FC236}">
-                <a16:creationId xmlns:a16="http://schemas.microsoft.com/office/drawing/2014/main" id="{FE4CF92F-1761-7C44-9238-07CC444AB680}"/>
+                <a16:creationId xmlns:a16="http://schemas.microsoft.com/office/drawing/2014/main" id="{31A832B3-A5A1-694E-A5A4-7A7B77248328}"/>
               </a:ext>
             </a:extLst>
           </p:cNvPr>
@@ -8700,7 +8485,7 @@
     </p:spTree>
     <p:extLst>
       <p:ext uri="{BB962C8B-B14F-4D97-AF65-F5344CB8AC3E}">
-        <p14:creationId xmlns:p14="http://schemas.microsoft.com/office/powerpoint/2010/main" val="3086038105"/>
+        <p14:creationId xmlns:p14="http://schemas.microsoft.com/office/powerpoint/2010/main" val="2168354648"/>
       </p:ext>
     </p:extLst>
   </p:cSld>

</xml_diff>